<commit_message>
updated the pptx and added code example
</commit_message>
<xml_diff>
--- a/tirgul/Express.pptx
+++ b/tirgul/Express.pptx
@@ -14298,8 +14298,12 @@
               <a:t> </a:t>
             </a:r>
             <a:r>
-              <a:rPr lang="en-US" smtClean="0"/>
-              <a:t>userName </a:t>
+              <a:rPr lang="en-US" dirty="0" err="1" smtClean="0"/>
+              <a:t>userName</a:t>
+            </a:r>
+            <a:r>
+              <a:rPr lang="en-US" dirty="0" smtClean="0"/>
+              <a:t> </a:t>
             </a:r>
             <a:r>
               <a:rPr lang="en-US" dirty="0"/>

</xml_diff>